<commit_message>
slide changes, css changes
</commit_message>
<xml_diff>
--- a/Ease_Pitchdeck.pptx
+++ b/Ease_Pitchdeck.pptx
@@ -4410,6 +4410,13 @@
   <p:clrMapOvr>
     <a:masterClrMapping/>
   </p:clrMapOvr>
+  <p:timing>
+    <p:tnLst>
+      <p:par>
+        <p:cTn xmlns:p14="http://schemas.microsoft.com/office/powerpoint/2010/main" id="1" dur="indefinite" restart="never" nodeType="tmRoot"/>
+      </p:par>
+    </p:tnLst>
+  </p:timing>
 </p:sld>
 </file>
 
@@ -4476,22 +4483,110 @@
           </a:p>
         </p:txBody>
       </p:sp>
-      <p:sp>
-        <p:nvSpPr>
-          <p:cNvPr id="5" name="Content Placeholder 4"/>
-          <p:cNvSpPr>
-            <a:spLocks noGrp="1"/>
-          </p:cNvSpPr>
-          <p:nvPr>
-            <p:ph sz="quarter" idx="14"/>
-          </p:nvPr>
-        </p:nvSpPr>
-        <p:spPr/>
-        <p:txBody>
-          <a:bodyPr/>
-          <a:lstStyle/>
-          <a:p>
-            <a:endParaRPr lang="en-US"/>
+      <p:pic>
+        <p:nvPicPr>
+          <p:cNvPr id="8" name="Picture 7"/>
+          <p:cNvPicPr>
+            <a:picLocks noChangeAspect="1"/>
+          </p:cNvPicPr>
+          <p:nvPr/>
+        </p:nvPicPr>
+        <p:blipFill>
+          <a:blip r:embed="rId2"/>
+          <a:stretch>
+            <a:fillRect/>
+          </a:stretch>
+        </p:blipFill>
+        <p:spPr>
+          <a:xfrm>
+            <a:off x="0" y="1468898"/>
+            <a:ext cx="9144000" cy="4191000"/>
+          </a:xfrm>
+          <a:prstGeom prst="rect">
+            <a:avLst/>
+          </a:prstGeom>
+        </p:spPr>
+      </p:pic>
+      <p:sp>
+        <p:nvSpPr>
+          <p:cNvPr id="6" name="TextBox 5"/>
+          <p:cNvSpPr txBox="1"/>
+          <p:nvPr/>
+        </p:nvSpPr>
+        <p:spPr>
+          <a:xfrm>
+            <a:off x="0" y="2789332"/>
+            <a:ext cx="9144000" cy="1384995"/>
+          </a:xfrm>
+          <a:prstGeom prst="rect">
+            <a:avLst/>
+          </a:prstGeom>
+          <a:solidFill>
+            <a:schemeClr val="bg1">
+              <a:alpha val="69000"/>
+            </a:schemeClr>
+          </a:solidFill>
+        </p:spPr>
+        <p:txBody>
+          <a:bodyPr wrap="square" rtlCol="0">
+            <a:spAutoFit/>
+          </a:bodyPr>
+          <a:lstStyle/>
+          <a:p>
+            <a:pPr algn="ctr"/>
+            <a:r>
+              <a:rPr lang="en-US" sz="2800" i="1" dirty="0" smtClean="0">
+                <a:latin typeface="Avenir Book"/>
+                <a:cs typeface="Avenir Book"/>
+              </a:rPr>
+              <a:t>Ease is an on-demand marketplace for services, starting with </a:t>
+            </a:r>
+            <a:r>
+              <a:rPr lang="en-US" sz="2800" b="1" i="1" dirty="0" smtClean="0">
+                <a:latin typeface="Avenir Book"/>
+                <a:cs typeface="Avenir Book"/>
+              </a:rPr>
+              <a:t>pet sitting</a:t>
+            </a:r>
+            <a:r>
+              <a:rPr lang="en-US" sz="2800" i="1" dirty="0" smtClean="0">
+                <a:latin typeface="Avenir Book"/>
+                <a:cs typeface="Avenir Book"/>
+              </a:rPr>
+              <a:t>, </a:t>
+            </a:r>
+            <a:r>
+              <a:rPr lang="en-US" sz="2800" b="1" i="1" dirty="0" smtClean="0">
+                <a:latin typeface="Avenir Book"/>
+                <a:cs typeface="Avenir Book"/>
+              </a:rPr>
+              <a:t>baby sitting</a:t>
+            </a:r>
+            <a:r>
+              <a:rPr lang="en-US" sz="2800" i="1" dirty="0" smtClean="0">
+                <a:latin typeface="Avenir Book"/>
+                <a:cs typeface="Avenir Book"/>
+              </a:rPr>
+              <a:t> and </a:t>
+            </a:r>
+            <a:r>
+              <a:rPr lang="en-US" sz="2800" b="1" i="1" dirty="0" smtClean="0">
+                <a:latin typeface="Avenir Book"/>
+                <a:cs typeface="Avenir Book"/>
+              </a:rPr>
+              <a:t>home cleaning</a:t>
+            </a:r>
+            <a:r>
+              <a:rPr lang="en-US" sz="2800" i="1" dirty="0" smtClean="0">
+                <a:latin typeface="Avenir Book"/>
+                <a:cs typeface="Avenir Book"/>
+              </a:rPr>
+              <a:t> services.  </a:t>
+            </a:r>
+            <a:endParaRPr lang="en-US" sz="2800" i="1" dirty="0">
+              <a:latin typeface="Avenir Book"/>
+              <a:cs typeface="Avenir Book"/>
+            </a:endParaRPr>
           </a:p>
         </p:txBody>
       </p:sp>
@@ -4505,6 +4600,13 @@
   <p:clrMapOvr>
     <a:masterClrMapping/>
   </p:clrMapOvr>
+  <p:timing>
+    <p:tnLst>
+      <p:par>
+        <p:cTn xmlns:p14="http://schemas.microsoft.com/office/powerpoint/2010/main" id="1" dur="indefinite" restart="never" nodeType="tmRoot"/>
+      </p:par>
+    </p:tnLst>
+  </p:timing>
 </p:sld>
 </file>
 
@@ -4544,39 +4646,6 @@
               <a:rPr lang="en-US" smtClean="0"/>
               <a:t>Pitch Deck</a:t>
             </a:r>
-            <a:endParaRPr lang="en-US" dirty="0"/>
-          </a:p>
-        </p:txBody>
-      </p:sp>
-      <p:sp>
-        <p:nvSpPr>
-          <p:cNvPr id="3" name="Slide Number Placeholder 2"/>
-          <p:cNvSpPr>
-            <a:spLocks noGrp="1"/>
-          </p:cNvSpPr>
-          <p:nvPr>
-            <p:ph type="sldNum" sz="quarter" idx="4294967295"/>
-          </p:nvPr>
-        </p:nvSpPr>
-        <p:spPr>
-          <a:xfrm>
-            <a:off x="5611000" y="3102476"/>
-            <a:ext cx="3380599" cy="3717433"/>
-          </a:xfrm>
-        </p:spPr>
-        <p:txBody>
-          <a:bodyPr/>
-          <a:lstStyle/>
-          <a:p>
-            <a:r>
-              <a:rPr lang="en-US" smtClean="0"/>
-              <a:t>A Team Services - </a:t>
-            </a:r>
-            <a:fld id="{AA06C19F-3F7B-4F6A-BA9A-8C994D654483}" type="slidenum">
-              <a:rPr lang="en-US" smtClean="0"/>
-              <a:pPr/>
-              <a:t>3</a:t>
-            </a:fld>
             <a:endParaRPr lang="en-US" dirty="0"/>
           </a:p>
         </p:txBody>
@@ -4934,8 +5003,8 @@
         </p:nvSpPr>
         <p:spPr>
           <a:xfrm>
-            <a:off x="4956766" y="1247775"/>
-            <a:ext cx="3616147" cy="1477328"/>
+            <a:off x="4710546" y="1247775"/>
+            <a:ext cx="3862367" cy="1477328"/>
           </a:xfrm>
           <a:prstGeom prst="rect">
             <a:avLst/>
@@ -4969,6 +5038,94 @@
             <a:r>
               <a:rPr lang="en-US" dirty="0" smtClean="0"/>
               <a:t>Singaporean travel and busy lifestyle</a:t>
+            </a:r>
+            <a:endParaRPr lang="en-US" dirty="0"/>
+          </a:p>
+        </p:txBody>
+      </p:sp>
+      <p:sp>
+        <p:nvSpPr>
+          <p:cNvPr id="23" name="TextBox 22"/>
+          <p:cNvSpPr txBox="1"/>
+          <p:nvPr/>
+        </p:nvSpPr>
+        <p:spPr>
+          <a:xfrm>
+            <a:off x="4710546" y="3108725"/>
+            <a:ext cx="3862368" cy="1200329"/>
+          </a:xfrm>
+          <a:prstGeom prst="rect">
+            <a:avLst/>
+          </a:prstGeom>
+          <a:noFill/>
+        </p:spPr>
+        <p:txBody>
+          <a:bodyPr wrap="square" rtlCol="0">
+            <a:spAutoFit/>
+          </a:bodyPr>
+          <a:lstStyle/>
+          <a:p>
+            <a:endParaRPr lang="en-US" dirty="0" smtClean="0"/>
+          </a:p>
+          <a:p>
+            <a:r>
+              <a:rPr lang="en-US" dirty="0" smtClean="0"/>
+              <a:t>Lack of ad-hoc childcare options</a:t>
+            </a:r>
+          </a:p>
+          <a:p>
+            <a:endParaRPr lang="en-US" dirty="0" smtClean="0"/>
+          </a:p>
+          <a:p>
+            <a:r>
+              <a:rPr lang="en-US" dirty="0" smtClean="0"/>
+              <a:t>70-75% of couples, dual-income</a:t>
+            </a:r>
+            <a:r>
+              <a:rPr lang="en-US" dirty="0" smtClean="0"/>
+              <a:t> (&gt;49) </a:t>
+            </a:r>
+            <a:endParaRPr lang="en-US" dirty="0"/>
+          </a:p>
+        </p:txBody>
+      </p:sp>
+      <p:sp>
+        <p:nvSpPr>
+          <p:cNvPr id="24" name="TextBox 23"/>
+          <p:cNvSpPr txBox="1"/>
+          <p:nvPr/>
+        </p:nvSpPr>
+        <p:spPr>
+          <a:xfrm>
+            <a:off x="4710546" y="4836212"/>
+            <a:ext cx="3862368" cy="1200329"/>
+          </a:xfrm>
+          <a:prstGeom prst="rect">
+            <a:avLst/>
+          </a:prstGeom>
+          <a:noFill/>
+        </p:spPr>
+        <p:txBody>
+          <a:bodyPr wrap="square" rtlCol="0">
+            <a:spAutoFit/>
+          </a:bodyPr>
+          <a:lstStyle/>
+          <a:p>
+            <a:endParaRPr lang="en-US" dirty="0"/>
+          </a:p>
+          <a:p>
+            <a:r>
+              <a:rPr lang="en-US" dirty="0" smtClean="0"/>
+              <a:t>Only 1/7 households have maids</a:t>
+            </a:r>
+          </a:p>
+          <a:p>
+            <a:endParaRPr lang="en-US" dirty="0" smtClean="0"/>
+          </a:p>
+          <a:p>
+            <a:r>
+              <a:rPr lang="en-US" dirty="0" smtClean="0"/>
+              <a:t>High disposable income of citizens</a:t>
             </a:r>
             <a:endParaRPr lang="en-US" dirty="0"/>
           </a:p>
@@ -4984,6 +5141,13 @@
   <p:clrMapOvr>
     <a:masterClrMapping/>
   </p:clrMapOvr>
+  <p:timing>
+    <p:tnLst>
+      <p:par>
+        <p:cTn xmlns:p14="http://schemas.microsoft.com/office/powerpoint/2010/main" id="1" dur="indefinite" restart="never" nodeType="tmRoot"/>
+      </p:par>
+    </p:tnLst>
+  </p:timing>
 </p:sld>
 </file>
 
@@ -5027,39 +5191,6 @@
           </a:p>
         </p:txBody>
       </p:sp>
-      <p:sp>
-        <p:nvSpPr>
-          <p:cNvPr id="3" name="Slide Number Placeholder 2"/>
-          <p:cNvSpPr>
-            <a:spLocks noGrp="1"/>
-          </p:cNvSpPr>
-          <p:nvPr>
-            <p:ph type="sldNum" sz="quarter" idx="4294967295"/>
-          </p:nvPr>
-        </p:nvSpPr>
-        <p:spPr>
-          <a:xfrm>
-            <a:off x="5611000" y="3102476"/>
-            <a:ext cx="3380599" cy="3717433"/>
-          </a:xfrm>
-        </p:spPr>
-        <p:txBody>
-          <a:bodyPr/>
-          <a:lstStyle/>
-          <a:p>
-            <a:r>
-              <a:rPr lang="en-US" smtClean="0"/>
-              <a:t>A Team Services - </a:t>
-            </a:r>
-            <a:fld id="{AA06C19F-3F7B-4F6A-BA9A-8C994D654483}" type="slidenum">
-              <a:rPr lang="en-US" smtClean="0"/>
-              <a:pPr/>
-              <a:t>4</a:t>
-            </a:fld>
-            <a:endParaRPr lang="en-US" dirty="0"/>
-          </a:p>
-        </p:txBody>
-      </p:sp>
     </p:spTree>
     <p:extLst>
       <p:ext uri="{BB962C8B-B14F-4D97-AF65-F5344CB8AC3E}">
@@ -5070,6 +5201,13 @@
   <p:clrMapOvr>
     <a:masterClrMapping/>
   </p:clrMapOvr>
+  <p:timing>
+    <p:tnLst>
+      <p:par>
+        <p:cTn xmlns:p14="http://schemas.microsoft.com/office/powerpoint/2010/main" id="1" dur="indefinite" restart="never" nodeType="tmRoot"/>
+      </p:par>
+    </p:tnLst>
+  </p:timing>
 </p:sld>
 </file>
 

</xml_diff>

<commit_message>
should've pushed here first
</commit_message>
<xml_diff>
--- a/Ease_Pitchdeck.pptx
+++ b/Ease_Pitchdeck.pptx
@@ -5,13 +5,14 @@
     <p:sldMasterId id="2147483648" r:id="rId1"/>
   </p:sldMasterIdLst>
   <p:notesMasterIdLst>
-    <p:notesMasterId r:id="rId6"/>
+    <p:notesMasterId r:id="rId7"/>
   </p:notesMasterIdLst>
   <p:sldIdLst>
     <p:sldId id="257" r:id="rId2"/>
     <p:sldId id="258" r:id="rId3"/>
     <p:sldId id="259" r:id="rId4"/>
     <p:sldId id="260" r:id="rId5"/>
+    <p:sldId id="261" r:id="rId6"/>
   </p:sldIdLst>
   <p:sldSz cx="9144000" cy="6858000" type="screen4x3"/>
   <p:notesSz cx="6858000" cy="9144000"/>
@@ -5256,6 +5257,106 @@
       </p:par>
     </p:tnLst>
   </p:timing>
+</p:sld>
+</file>
+
+<file path=ppt/slides/slide5.xml><?xml version="1.0" encoding="utf-8"?>
+<p:sld xmlns:a="http://schemas.openxmlformats.org/drawingml/2006/main" xmlns:r="http://schemas.openxmlformats.org/officeDocument/2006/relationships" xmlns:p="http://schemas.openxmlformats.org/presentationml/2006/main">
+  <p:cSld>
+    <p:spTree>
+      <p:nvGrpSpPr>
+        <p:cNvPr id="1" name=""/>
+        <p:cNvGrpSpPr/>
+        <p:nvPr/>
+      </p:nvGrpSpPr>
+      <p:grpSpPr>
+        <a:xfrm>
+          <a:off x="0" y="0"/>
+          <a:ext cx="0" cy="0"/>
+          <a:chOff x="0" y="0"/>
+          <a:chExt cx="0" cy="0"/>
+        </a:xfrm>
+      </p:grpSpPr>
+      <p:sp>
+        <p:nvSpPr>
+          <p:cNvPr id="2" name="Footer Placeholder 1"/>
+          <p:cNvSpPr>
+            <a:spLocks noGrp="1"/>
+          </p:cNvSpPr>
+          <p:nvPr>
+            <p:ph type="ftr" sz="quarter" idx="11"/>
+          </p:nvPr>
+        </p:nvSpPr>
+        <p:spPr/>
+        <p:txBody>
+          <a:bodyPr/>
+          <a:lstStyle/>
+          <a:p>
+            <a:r>
+              <a:rPr lang="en-US" smtClean="0"/>
+              <a:t>Pitch Deck</a:t>
+            </a:r>
+            <a:endParaRPr lang="en-US" dirty="0"/>
+          </a:p>
+        </p:txBody>
+      </p:sp>
+      <p:sp>
+        <p:nvSpPr>
+          <p:cNvPr id="3" name="Content Placeholder 2"/>
+          <p:cNvSpPr>
+            <a:spLocks noGrp="1"/>
+          </p:cNvSpPr>
+          <p:nvPr>
+            <p:ph sz="quarter" idx="13"/>
+          </p:nvPr>
+        </p:nvSpPr>
+        <p:spPr/>
+        <p:txBody>
+          <a:bodyPr/>
+          <a:lstStyle/>
+          <a:p>
+            <a:r>
+              <a:rPr lang="en-US" dirty="0" smtClean="0"/>
+              <a:t>ERD</a:t>
+            </a:r>
+            <a:endParaRPr lang="en-US" dirty="0"/>
+          </a:p>
+        </p:txBody>
+      </p:sp>
+      <p:pic>
+        <p:nvPicPr>
+          <p:cNvPr id="6" name="Picture 5"/>
+          <p:cNvPicPr>
+            <a:picLocks noChangeAspect="1"/>
+          </p:cNvPicPr>
+          <p:nvPr/>
+        </p:nvPicPr>
+        <p:blipFill>
+          <a:blip r:embed="rId2"/>
+          <a:stretch>
+            <a:fillRect/>
+          </a:stretch>
+        </p:blipFill>
+        <p:spPr>
+          <a:xfrm>
+            <a:off x="0" y="1447800"/>
+            <a:ext cx="9144000" cy="3938669"/>
+          </a:xfrm>
+          <a:prstGeom prst="rect">
+            <a:avLst/>
+          </a:prstGeom>
+        </p:spPr>
+      </p:pic>
+    </p:spTree>
+    <p:extLst>
+      <p:ext uri="{BB962C8B-B14F-4D97-AF65-F5344CB8AC3E}">
+        <p14:creationId xmlns:p14="http://schemas.microsoft.com/office/powerpoint/2010/main" val="1187554058"/>
+      </p:ext>
+    </p:extLst>
+  </p:cSld>
+  <p:clrMapOvr>
+    <a:masterClrMapping/>
+  </p:clrMapOvr>
 </p:sld>
 </file>
 

</xml_diff>